<commit_message>
Final QA checks on rep-workflows
</commit_message>
<xml_diff>
--- a/rep-workflows.pptx
+++ b/rep-workflows.pptx
@@ -290,7 +290,7 @@
           <a:p>
             <a:fld id="{0B842F42-2CE9-4E35-95C1-410DC08A50B1}" type="datetimeFigureOut">
               <a:rPr lang="en-US" smtClean="0"/>
-              <a:t>11/2/23</a:t>
+              <a:t>11/3/2023</a:t>
             </a:fld>
             <a:endParaRPr lang="en-US"/>
           </a:p>
@@ -455,7 +455,7 @@
           <a:p>
             <a:fld id="{6F282904-F315-4730-8D91-37D99E141A6F}" type="datetimeFigureOut">
               <a:rPr lang="en-US" smtClean="0"/>
-              <a:t>11/2/23</a:t>
+              <a:t>11/3/2023</a:t>
             </a:fld>
             <a:endParaRPr lang="en-US"/>
           </a:p>
@@ -6936,8 +6936,8 @@
         </p:nvSpPr>
         <p:spPr>
           <a:xfrm>
-            <a:off x="8974533" y="4410488"/>
-            <a:ext cx="3103029" cy="323165"/>
+            <a:off x="8866184" y="4410488"/>
+            <a:ext cx="3322641" cy="323165"/>
           </a:xfrm>
           <a:prstGeom prst="rect">
             <a:avLst/>
@@ -6957,16 +6957,20 @@
             </a:pPr>
             <a:r>
               <a:rPr lang="en-US" sz="1000" dirty="0"/>
-              <a:t>Source: https://</a:t>
-            </a:r>
-            <a:r>
-              <a:rPr lang="en-US" sz="1000" dirty="0" err="1"/>
-              <a:t>www.osti.gov</a:t>
-            </a:r>
-            <a:r>
-              <a:rPr lang="en-US" sz="1000" dirty="0"/>
-              <a:t>/servlets/purl/1909092</a:t>
-            </a:r>
+              <a:t>Source: </a:t>
+            </a:r>
+            <a:r>
+              <a:rPr lang="en-US" sz="1000" b="0" i="0" u="none" strike="noStrike" dirty="0">
+                <a:solidFill>
+                  <a:srgbClr val="3277B3"/>
+                </a:solidFill>
+                <a:effectLst/>
+                <a:latin typeface="Roboto" panose="02000000000000000000" pitchFamily="2" charset="0"/>
+                <a:hlinkClick r:id="rId7" tooltip="Document DOI URL"/>
+              </a:rPr>
+              <a:t>https://doi.org/10.1007/978-3-031-23606-8_9</a:t>
+            </a:r>
+            <a:endParaRPr lang="en-US" sz="1000" dirty="0"/>
           </a:p>
         </p:txBody>
       </p:sp>
@@ -16734,99 +16738,7 @@
                 <a:effectLst/>
                 <a:latin typeface="HelveticaNeue Regular"/>
               </a:rPr>
-              <a:t>: 10.1109/PyHPC.2016.005.</a:t>
-            </a:r>
-          </a:p>
-          <a:p>
-            <a:r>
-              <a:rPr lang="en-US" sz="2000" b="0" i="0" u="none" strike="noStrike" dirty="0">
-                <a:solidFill>
-                  <a:srgbClr val="333333"/>
-                </a:solidFill>
-                <a:effectLst/>
-                <a:latin typeface="HelveticaNeue Regular"/>
-              </a:rPr>
-              <a:t>S. Bharathi, A. Chervenak, E. </a:t>
-            </a:r>
-            <a:r>
-              <a:rPr lang="en-US" sz="2000" b="0" i="0" u="none" strike="noStrike" dirty="0" err="1">
-                <a:solidFill>
-                  <a:srgbClr val="333333"/>
-                </a:solidFill>
-                <a:effectLst/>
-                <a:latin typeface="HelveticaNeue Regular"/>
-              </a:rPr>
-              <a:t>Deelman</a:t>
-            </a:r>
-            <a:r>
-              <a:rPr lang="en-US" sz="2000" b="0" i="0" u="none" strike="noStrike" dirty="0">
-                <a:solidFill>
-                  <a:srgbClr val="333333"/>
-                </a:solidFill>
-                <a:effectLst/>
-                <a:latin typeface="HelveticaNeue Regular"/>
-              </a:rPr>
-              <a:t>, G. Mehta, M. -H. </a:t>
-            </a:r>
-            <a:r>
-              <a:rPr lang="en-US" sz="2000" b="0" i="0" u="none" strike="noStrike" dirty="0" err="1">
-                <a:solidFill>
-                  <a:srgbClr val="333333"/>
-                </a:solidFill>
-                <a:effectLst/>
-                <a:latin typeface="HelveticaNeue Regular"/>
-              </a:rPr>
-              <a:t>Su</a:t>
-            </a:r>
-            <a:r>
-              <a:rPr lang="en-US" sz="2000" b="0" i="0" u="none" strike="noStrike" dirty="0">
-                <a:solidFill>
-                  <a:srgbClr val="333333"/>
-                </a:solidFill>
-                <a:effectLst/>
-                <a:latin typeface="HelveticaNeue Regular"/>
-              </a:rPr>
-              <a:t> and K. </a:t>
-            </a:r>
-            <a:r>
-              <a:rPr lang="en-US" sz="2000" b="0" i="0" u="none" strike="noStrike" dirty="0" err="1">
-                <a:solidFill>
-                  <a:srgbClr val="333333"/>
-                </a:solidFill>
-                <a:effectLst/>
-                <a:latin typeface="HelveticaNeue Regular"/>
-              </a:rPr>
-              <a:t>Vahi</a:t>
-            </a:r>
-            <a:r>
-              <a:rPr lang="en-US" sz="2000" b="0" i="0" u="none" strike="noStrike" dirty="0">
-                <a:solidFill>
-                  <a:srgbClr val="333333"/>
-                </a:solidFill>
-                <a:effectLst/>
-                <a:latin typeface="HelveticaNeue Regular"/>
-              </a:rPr>
-              <a:t>, "Characterization of scientific workflows," </a:t>
-            </a:r>
-            <a:r>
-              <a:rPr lang="en-US" sz="2000" b="0" i="1" u="none" strike="noStrike" dirty="0">
-                <a:solidFill>
-                  <a:srgbClr val="333333"/>
-                </a:solidFill>
-                <a:effectLst/>
-                <a:latin typeface="HelveticaNeue Regular"/>
-              </a:rPr>
-              <a:t>2008 Third Workshop on Workflows in Support of Large-Scale Science</a:t>
-            </a:r>
-            <a:r>
-              <a:rPr lang="en-US" sz="2000" b="0" i="0" u="none" strike="noStrike" dirty="0">
-                <a:solidFill>
-                  <a:srgbClr val="333333"/>
-                </a:solidFill>
-                <a:effectLst/>
-                <a:latin typeface="HelveticaNeue Regular"/>
-              </a:rPr>
-              <a:t>, Austin, TX, USA, 2008, pp. 1-10, doi:</a:t>
+              <a:t>: </a:t>
             </a:r>
             <a:r>
               <a:rPr lang="en-US" sz="2000" b="0" i="0" u="none" strike="noStrike" dirty="0">
@@ -16837,7 +16749,7 @@
                 <a:latin typeface="HelveticaNeue Regular"/>
                 <a:hlinkClick r:id="rId3"/>
               </a:rPr>
-              <a:t>10.1109/WORKS.2008.4723958</a:t>
+              <a:t>10.1109/PyHPC.2016.005</a:t>
             </a:r>
             <a:r>
               <a:rPr lang="en-US" sz="2000" b="0" i="0" u="none" strike="noStrike" dirty="0">
@@ -16852,44 +16764,94 @@
           </a:p>
           <a:p>
             <a:r>
-              <a:rPr lang="en-US" sz="2000" b="0" i="0" u="none" strike="noStrike" dirty="0" err="1">
+              <a:rPr lang="en-US" sz="2000" b="0" i="0" u="none" strike="noStrike" dirty="0">
                 <a:solidFill>
                   <a:srgbClr val="333333"/>
                 </a:solidFill>
                 <a:effectLst/>
                 <a:latin typeface="HelveticaNeue Regular"/>
               </a:rPr>
-              <a:t>Blaschke</a:t>
-            </a:r>
-            <a:r>
-              <a:rPr lang="en-US" sz="2000" b="0" i="0" u="none" strike="noStrike" dirty="0">
+              <a:t>S. Bharathi, A. Chervenak, E. </a:t>
+            </a:r>
+            <a:r>
+              <a:rPr lang="en-US" sz="2000" b="0" i="0" u="none" strike="noStrike" dirty="0" err="1">
                 <a:solidFill>
                   <a:srgbClr val="333333"/>
                 </a:solidFill>
                 <a:effectLst/>
                 <a:latin typeface="HelveticaNeue Regular"/>
               </a:rPr>
-              <a:t>, Johannes P., Brewster, Aaron S., et. al. 2021. "Real-Time XFEL Data Analysis at SLAC and NERSC: a Trial Run of Nascent </a:t>
-            </a:r>
-            <a:r>
-              <a:rPr lang="en-US" sz="2000" b="0" i="0" u="none" strike="noStrike" dirty="0" err="1">
+              <a:t>Deelman</a:t>
+            </a:r>
+            <a:r>
+              <a:rPr lang="en-US" sz="2000" b="0" i="0" u="none" strike="noStrike" dirty="0">
                 <a:solidFill>
                   <a:srgbClr val="333333"/>
                 </a:solidFill>
                 <a:effectLst/>
                 <a:latin typeface="HelveticaNeue Regular"/>
               </a:rPr>
-              <a:t>Exascale</a:t>
-            </a:r>
-            <a:r>
-              <a:rPr lang="en-US" sz="2000" b="0" i="0" u="none" strike="noStrike" dirty="0">
+              <a:t>, G. Mehta, M. -H. </a:t>
+            </a:r>
+            <a:r>
+              <a:rPr lang="en-US" sz="2000" b="0" i="0" u="none" strike="noStrike" dirty="0" err="1">
                 <a:solidFill>
                   <a:srgbClr val="333333"/>
                 </a:solidFill>
                 <a:effectLst/>
                 <a:latin typeface="HelveticaNeue Regular"/>
               </a:rPr>
-              <a:t> Experimental Data Analysis". United States. </a:t>
+              <a:t>Su</a:t>
+            </a:r>
+            <a:r>
+              <a:rPr lang="en-US" sz="2000" b="0" i="0" u="none" strike="noStrike" dirty="0">
+                <a:solidFill>
+                  <a:srgbClr val="333333"/>
+                </a:solidFill>
+                <a:effectLst/>
+                <a:latin typeface="HelveticaNeue Regular"/>
+              </a:rPr>
+              <a:t> and K. </a:t>
+            </a:r>
+            <a:r>
+              <a:rPr lang="en-US" sz="2000" b="0" i="0" u="none" strike="noStrike" dirty="0" err="1">
+                <a:solidFill>
+                  <a:srgbClr val="333333"/>
+                </a:solidFill>
+                <a:effectLst/>
+                <a:latin typeface="HelveticaNeue Regular"/>
+              </a:rPr>
+              <a:t>Vahi</a:t>
+            </a:r>
+            <a:r>
+              <a:rPr lang="en-US" sz="2000" b="0" i="0" u="none" strike="noStrike" dirty="0">
+                <a:solidFill>
+                  <a:srgbClr val="333333"/>
+                </a:solidFill>
+                <a:effectLst/>
+                <a:latin typeface="HelveticaNeue Regular"/>
+              </a:rPr>
+              <a:t>, "Characterization of scientific workflows," </a:t>
+            </a:r>
+            <a:r>
+              <a:rPr lang="en-US" sz="2000" b="0" i="1" u="none" strike="noStrike" dirty="0">
+                <a:solidFill>
+                  <a:srgbClr val="333333"/>
+                </a:solidFill>
+                <a:effectLst/>
+                <a:latin typeface="HelveticaNeue Regular"/>
+              </a:rPr>
+              <a:t>2008 Third Workshop on Workflows in Support of Large-Scale Science</a:t>
+            </a:r>
+            <a:r>
+              <a:rPr lang="en-US" sz="2000" b="0" i="0" u="none" strike="noStrike" dirty="0">
+                <a:solidFill>
+                  <a:srgbClr val="333333"/>
+                </a:solidFill>
+                <a:effectLst/>
+                <a:latin typeface="HelveticaNeue Regular"/>
+              </a:rPr>
+              <a:t>, Austin, TX, USA, 2008, pp. 1-10, doi:</a:t>
             </a:r>
             <a:r>
               <a:rPr lang="en-US" sz="2000" b="0" i="0" u="none" strike="noStrike" dirty="0">
@@ -16900,7 +16862,7 @@
                 <a:latin typeface="HelveticaNeue Regular"/>
                 <a:hlinkClick r:id="rId4"/>
               </a:rPr>
-              <a:t>https://www.osti.gov/servlets/purl/1827927</a:t>
+              <a:t>10.1109/WORKS.2008.4723958</a:t>
             </a:r>
             <a:r>
               <a:rPr lang="en-US" sz="2000" b="0" i="0" u="none" strike="noStrike" dirty="0">
@@ -16915,14 +16877,44 @@
           </a:p>
           <a:p>
             <a:r>
-              <a:rPr lang="en-US" sz="2000" b="0" i="0" u="none" strike="noStrike" dirty="0">
+              <a:rPr lang="en-US" sz="2000" b="0" i="0" u="none" strike="noStrike" dirty="0" err="1">
                 <a:solidFill>
                   <a:srgbClr val="333333"/>
                 </a:solidFill>
                 <a:effectLst/>
                 <a:latin typeface="HelveticaNeue Regular"/>
               </a:rPr>
-              <a:t>Younge, Andrew J. 2021. "Containers and the Truth between HPC &amp; Cloud System Software Convergence.". United States. DOI:</a:t>
+              <a:t>Blaschke</a:t>
+            </a:r>
+            <a:r>
+              <a:rPr lang="en-US" sz="2000" b="0" i="0" u="none" strike="noStrike" dirty="0">
+                <a:solidFill>
+                  <a:srgbClr val="333333"/>
+                </a:solidFill>
+                <a:effectLst/>
+                <a:latin typeface="HelveticaNeue Regular"/>
+              </a:rPr>
+              <a:t>, Johannes P., Brewster, Aaron S., et. al. 2021. "Real-Time XFEL Data Analysis at SLAC and NERSC: a Trial Run of Nascent </a:t>
+            </a:r>
+            <a:r>
+              <a:rPr lang="en-US" sz="2000" b="0" i="0" u="none" strike="noStrike" dirty="0" err="1">
+                <a:solidFill>
+                  <a:srgbClr val="333333"/>
+                </a:solidFill>
+                <a:effectLst/>
+                <a:latin typeface="HelveticaNeue Regular"/>
+              </a:rPr>
+              <a:t>Exascale</a:t>
+            </a:r>
+            <a:r>
+              <a:rPr lang="en-US" sz="2000" b="0" i="0" u="none" strike="noStrike" dirty="0">
+                <a:solidFill>
+                  <a:srgbClr val="333333"/>
+                </a:solidFill>
+                <a:effectLst/>
+                <a:latin typeface="HelveticaNeue Regular"/>
+              </a:rPr>
+              <a:t> Experimental Data Analysis". United States. </a:t>
             </a:r>
             <a:r>
               <a:rPr lang="en-US" sz="2000" b="0" i="0" u="none" strike="noStrike" dirty="0">
@@ -16932,6 +16924,39 @@
                 <a:effectLst/>
                 <a:latin typeface="HelveticaNeue Regular"/>
                 <a:hlinkClick r:id="rId5"/>
+              </a:rPr>
+              <a:t>https://www.osti.gov/servlets/purl/1827927</a:t>
+            </a:r>
+            <a:r>
+              <a:rPr lang="en-US" sz="2000" b="0" i="0" u="none" strike="noStrike" dirty="0">
+                <a:solidFill>
+                  <a:srgbClr val="333333"/>
+                </a:solidFill>
+                <a:effectLst/>
+                <a:latin typeface="HelveticaNeue Regular"/>
+              </a:rPr>
+              <a:t>.</a:t>
+            </a:r>
+          </a:p>
+          <a:p>
+            <a:r>
+              <a:rPr lang="en-US" sz="2000" b="0" i="0" u="none" strike="noStrike" dirty="0">
+                <a:solidFill>
+                  <a:srgbClr val="333333"/>
+                </a:solidFill>
+                <a:effectLst/>
+                <a:latin typeface="HelveticaNeue Regular"/>
+              </a:rPr>
+              <a:t>Younge, Andrew J. 2021. "Containers and the Truth between HPC &amp; Cloud System Software Convergence.". United States. DOI:</a:t>
+            </a:r>
+            <a:r>
+              <a:rPr lang="en-US" sz="2000" b="0" i="0" u="none" strike="noStrike" dirty="0">
+                <a:solidFill>
+                  <a:srgbClr val="333333"/>
+                </a:solidFill>
+                <a:effectLst/>
+                <a:latin typeface="HelveticaNeue Regular"/>
+                <a:hlinkClick r:id="rId6"/>
               </a:rPr>
               <a:t>10.2172/1859696</a:t>
             </a:r>
@@ -22617,12 +22642,6 @@
 </file>
 
 <file path=customXml/item1.xml><?xml version="1.0" encoding="utf-8"?>
-<p:properties xmlns:p="http://schemas.microsoft.com/office/2006/metadata/properties" xmlns:xsi="http://www.w3.org/2001/XMLSchema-instance" xmlns:pc="http://schemas.microsoft.com/office/infopath/2007/PartnerControls">
-  <documentManagement/>
-</p:properties>
-</file>
-
-<file path=customXml/item2.xml><?xml version="1.0" encoding="utf-8"?>
 <ct:contentTypeSchema xmlns:ct="http://schemas.microsoft.com/office/2006/metadata/contentType" xmlns:ma="http://schemas.microsoft.com/office/2006/metadata/properties/metaAttributes" ct:_="" ma:_="" ma:contentTypeName="Document" ma:contentTypeID="0x010100565464437F680748A68B85EB6594EA7D" ma:contentTypeVersion="0" ma:contentTypeDescription="Create a new document." ma:contentTypeScope="" ma:versionID="fe3f4dd58d5914c51cfc6deaa8ad845c">
   <xsd:schema xmlns:xsd="http://www.w3.org/2001/XMLSchema" xmlns:p="http://schemas.microsoft.com/office/2006/metadata/properties" targetNamespace="http://schemas.microsoft.com/office/2006/metadata/properties" ma:root="true" ma:fieldsID="4aeb20c0e3442673af7ee10786458764">
     <xsd:element name="properties">
@@ -22671,6 +22690,12 @@
 </ct:contentTypeSchema>
 </file>
 
+<file path=customXml/item2.xml><?xml version="1.0" encoding="utf-8"?>
+<p:properties xmlns:p="http://schemas.microsoft.com/office/2006/metadata/properties" xmlns:xsi="http://www.w3.org/2001/XMLSchema-instance" xmlns:pc="http://schemas.microsoft.com/office/infopath/2007/PartnerControls">
+  <documentManagement/>
+</p:properties>
+</file>
+
 <file path=customXml/item3.xml><?xml version="1.0" encoding="utf-8"?>
 <?mso-contentType ?>
 <FormTemplates xmlns="http://schemas.microsoft.com/sharepoint/v3/contenttype/forms">
@@ -22681,6 +22706,21 @@
 </file>
 
 <file path=customXml/itemProps1.xml><?xml version="1.0" encoding="utf-8"?>
+<ds:datastoreItem xmlns:ds="http://schemas.openxmlformats.org/officeDocument/2006/customXml" ds:itemID="{E8DB7DEB-074E-4EE8-9B6E-FD277323109C}">
+  <ds:schemaRefs>
+    <ds:schemaRef ds:uri="http://schemas.microsoft.com/office/2006/metadata/contentType"/>
+    <ds:schemaRef ds:uri="http://schemas.microsoft.com/office/2006/metadata/properties/metaAttributes"/>
+    <ds:schemaRef ds:uri="http://www.w3.org/2001/XMLSchema"/>
+    <ds:schemaRef ds:uri="http://schemas.microsoft.com/office/2006/metadata/properties"/>
+    <ds:schemaRef ds:uri="http://schemas.openxmlformats.org/package/2006/metadata/core-properties"/>
+    <ds:schemaRef ds:uri="http://purl.org/dc/elements/1.1/"/>
+    <ds:schemaRef ds:uri="http://purl.org/dc/terms/"/>
+    <ds:schemaRef ds:uri="http://schemas.microsoft.com/office/internal/2005/internalDocumentation"/>
+  </ds:schemaRefs>
+</ds:datastoreItem>
+</file>
+
+<file path=customXml/itemProps2.xml><?xml version="1.0" encoding="utf-8"?>
 <ds:datastoreItem xmlns:ds="http://schemas.openxmlformats.org/officeDocument/2006/customXml" ds:itemID="{A50EC660-24D0-43A0-AE5E-E274115E726B}">
   <ds:schemaRefs>
     <ds:schemaRef ds:uri="http://purl.org/dc/elements/1.1/"/>
@@ -22695,21 +22735,6 @@
 </ds:datastoreItem>
 </file>
 
-<file path=customXml/itemProps2.xml><?xml version="1.0" encoding="utf-8"?>
-<ds:datastoreItem xmlns:ds="http://schemas.openxmlformats.org/officeDocument/2006/customXml" ds:itemID="{E8DB7DEB-074E-4EE8-9B6E-FD277323109C}">
-  <ds:schemaRefs>
-    <ds:schemaRef ds:uri="http://schemas.microsoft.com/office/2006/metadata/contentType"/>
-    <ds:schemaRef ds:uri="http://schemas.microsoft.com/office/2006/metadata/properties/metaAttributes"/>
-    <ds:schemaRef ds:uri="http://www.w3.org/2001/XMLSchema"/>
-    <ds:schemaRef ds:uri="http://schemas.microsoft.com/office/2006/metadata/properties"/>
-    <ds:schemaRef ds:uri="http://schemas.openxmlformats.org/package/2006/metadata/core-properties"/>
-    <ds:schemaRef ds:uri="http://purl.org/dc/elements/1.1/"/>
-    <ds:schemaRef ds:uri="http://purl.org/dc/terms/"/>
-    <ds:schemaRef ds:uri="http://schemas.microsoft.com/office/internal/2005/internalDocumentation"/>
-  </ds:schemaRefs>
-</ds:datastoreItem>
-</file>
-
 <file path=customXml/itemProps3.xml><?xml version="1.0" encoding="utf-8"?>
 <ds:datastoreItem xmlns:ds="http://schemas.openxmlformats.org/officeDocument/2006/customXml" ds:itemID="{19E20559-B232-4371-8690-E3D8007EDB82}">
   <ds:schemaRefs>

</xml_diff>